<commit_message>
Parser is now working - small cases
</commit_message>
<xml_diff>
--- a/Final Project.pptx
+++ b/Final Project.pptx
@@ -6,25 +6,28 @@
     <p:sldMasterId id="2147483669" r:id="rId2"/>
   </p:sldMasterIdLst>
   <p:notesMasterIdLst>
-    <p:notesMasterId r:id="rId11"/>
+    <p:notesMasterId r:id="rId12"/>
   </p:notesMasterIdLst>
   <p:sldIdLst>
     <p:sldId id="256" r:id="rId3"/>
     <p:sldId id="262" r:id="rId4"/>
     <p:sldId id="263" r:id="rId5"/>
     <p:sldId id="268" r:id="rId6"/>
-    <p:sldId id="274" r:id="rId7"/>
-    <p:sldId id="259" r:id="rId8"/>
+    <p:sldId id="259" r:id="rId7"/>
+    <p:sldId id="274" r:id="rId8"/>
     <p:sldId id="258" r:id="rId9"/>
     <p:sldId id="272" r:id="rId10"/>
+    <p:sldId id="276" r:id="rId11"/>
   </p:sldIdLst>
   <p:sldSz cx="9144000" cy="5143500" type="screen16x9"/>
   <p:notesSz cx="6858000" cy="9144000"/>
   <p:embeddedFontLst>
     <p:embeddedFont>
       <p:font typeface="Muli" panose="020B0604020202020204" charset="0"/>
-      <p:regular r:id="rId12"/>
-      <p:italic r:id="rId13"/>
+      <p:regular r:id="rId13"/>
+      <p:bold r:id="rId14"/>
+      <p:italic r:id="rId15"/>
+      <p:boldItalic r:id="rId16"/>
     </p:embeddedFont>
   </p:embeddedFontLst>
   <p:defaultTextStyle>
@@ -952,6 +955,117 @@
   <p:cSld>
     <p:spTree>
       <p:nvGrpSpPr>
+        <p:cNvPr id="1" name="Shape 72"/>
+        <p:cNvGrpSpPr/>
+        <p:nvPr/>
+      </p:nvGrpSpPr>
+      <p:grpSpPr>
+        <a:xfrm>
+          <a:off x="0" y="0"/>
+          <a:ext cx="0" cy="0"/>
+          <a:chOff x="0" y="0"/>
+          <a:chExt cx="0" cy="0"/>
+        </a:xfrm>
+      </p:grpSpPr>
+      <p:sp>
+        <p:nvSpPr>
+          <p:cNvPr id="73" name="Shape 73"/>
+          <p:cNvSpPr>
+            <a:spLocks noGrp="1" noRot="1" noChangeAspect="1"/>
+          </p:cNvSpPr>
+          <p:nvPr>
+            <p:ph type="sldImg" idx="2"/>
+          </p:nvPr>
+        </p:nvSpPr>
+        <p:spPr>
+          <a:xfrm>
+            <a:off x="381000" y="685800"/>
+            <a:ext cx="6096000" cy="3429000"/>
+          </a:xfrm>
+          <a:custGeom>
+            <a:avLst/>
+            <a:gdLst/>
+            <a:ahLst/>
+            <a:cxnLst/>
+            <a:rect l="0" t="0" r="0" b="0"/>
+            <a:pathLst>
+              <a:path w="120000" h="120000" extrusionOk="0">
+                <a:moveTo>
+                  <a:pt x="0" y="0"/>
+                </a:moveTo>
+                <a:lnTo>
+                  <a:pt x="120000" y="0"/>
+                </a:lnTo>
+                <a:lnTo>
+                  <a:pt x="120000" y="120000"/>
+                </a:lnTo>
+                <a:lnTo>
+                  <a:pt x="0" y="120000"/>
+                </a:lnTo>
+                <a:close/>
+              </a:path>
+            </a:pathLst>
+          </a:custGeom>
+          <a:noFill/>
+          <a:ln w="9525" cap="flat" cmpd="sng">
+            <a:solidFill>
+              <a:srgbClr val="000000"/>
+            </a:solidFill>
+            <a:prstDash val="solid"/>
+            <a:round/>
+            <a:headEnd type="none" w="med" len="med"/>
+            <a:tailEnd type="none" w="med" len="med"/>
+          </a:ln>
+        </p:spPr>
+      </p:sp>
+      <p:sp>
+        <p:nvSpPr>
+          <p:cNvPr id="74" name="Shape 74"/>
+          <p:cNvSpPr txBox="1">
+            <a:spLocks noGrp="1"/>
+          </p:cNvSpPr>
+          <p:nvPr>
+            <p:ph type="body" idx="1"/>
+          </p:nvPr>
+        </p:nvSpPr>
+        <p:spPr>
+          <a:xfrm>
+            <a:off x="685800" y="4343400"/>
+            <a:ext cx="5486399" cy="4114800"/>
+          </a:xfrm>
+          <a:prstGeom prst="rect">
+            <a:avLst/>
+          </a:prstGeom>
+        </p:spPr>
+        <p:txBody>
+          <a:bodyPr lIns="91425" tIns="91425" rIns="91425" bIns="91425" anchor="t" anchorCtr="0">
+            <a:noAutofit/>
+          </a:bodyPr>
+          <a:lstStyle/>
+          <a:p>
+            <a:pPr>
+              <a:spcBef>
+                <a:spcPts val="0"/>
+              </a:spcBef>
+              <a:buNone/>
+            </a:pPr>
+            <a:endParaRPr dirty="0"/>
+          </a:p>
+        </p:txBody>
+      </p:sp>
+    </p:spTree>
+  </p:cSld>
+  <p:clrMapOvr>
+    <a:masterClrMapping/>
+  </p:clrMapOvr>
+</p:notes>
+</file>
+
+<file path=ppt/notesSlides/notesSlide6.xml><?xml version="1.0" encoding="utf-8"?>
+<p:notes xmlns:a="http://schemas.openxmlformats.org/drawingml/2006/main" xmlns:r="http://schemas.openxmlformats.org/officeDocument/2006/relationships" xmlns:p="http://schemas.openxmlformats.org/presentationml/2006/main" showMasterSp="0" showMasterPhAnim="0">
+  <p:cSld>
+    <p:spTree>
+      <p:nvGrpSpPr>
         <p:cNvPr id="1" name="Shape 313"/>
         <p:cNvGrpSpPr/>
         <p:nvPr/>
@@ -1018,117 +1132,6 @@
       <p:sp>
         <p:nvSpPr>
           <p:cNvPr id="315" name="Shape 315"/>
-          <p:cNvSpPr txBox="1">
-            <a:spLocks noGrp="1"/>
-          </p:cNvSpPr>
-          <p:nvPr>
-            <p:ph type="body" idx="1"/>
-          </p:nvPr>
-        </p:nvSpPr>
-        <p:spPr>
-          <a:xfrm>
-            <a:off x="685800" y="4343400"/>
-            <a:ext cx="5486399" cy="4114800"/>
-          </a:xfrm>
-          <a:prstGeom prst="rect">
-            <a:avLst/>
-          </a:prstGeom>
-        </p:spPr>
-        <p:txBody>
-          <a:bodyPr lIns="91425" tIns="91425" rIns="91425" bIns="91425" anchor="t" anchorCtr="0">
-            <a:noAutofit/>
-          </a:bodyPr>
-          <a:lstStyle/>
-          <a:p>
-            <a:pPr>
-              <a:spcBef>
-                <a:spcPts val="0"/>
-              </a:spcBef>
-              <a:buNone/>
-            </a:pPr>
-            <a:endParaRPr dirty="0"/>
-          </a:p>
-        </p:txBody>
-      </p:sp>
-    </p:spTree>
-  </p:cSld>
-  <p:clrMapOvr>
-    <a:masterClrMapping/>
-  </p:clrMapOvr>
-</p:notes>
-</file>
-
-<file path=ppt/notesSlides/notesSlide6.xml><?xml version="1.0" encoding="utf-8"?>
-<p:notes xmlns:a="http://schemas.openxmlformats.org/drawingml/2006/main" xmlns:r="http://schemas.openxmlformats.org/officeDocument/2006/relationships" xmlns:p="http://schemas.openxmlformats.org/presentationml/2006/main" showMasterSp="0" showMasterPhAnim="0">
-  <p:cSld>
-    <p:spTree>
-      <p:nvGrpSpPr>
-        <p:cNvPr id="1" name="Shape 72"/>
-        <p:cNvGrpSpPr/>
-        <p:nvPr/>
-      </p:nvGrpSpPr>
-      <p:grpSpPr>
-        <a:xfrm>
-          <a:off x="0" y="0"/>
-          <a:ext cx="0" cy="0"/>
-          <a:chOff x="0" y="0"/>
-          <a:chExt cx="0" cy="0"/>
-        </a:xfrm>
-      </p:grpSpPr>
-      <p:sp>
-        <p:nvSpPr>
-          <p:cNvPr id="73" name="Shape 73"/>
-          <p:cNvSpPr>
-            <a:spLocks noGrp="1" noRot="1" noChangeAspect="1"/>
-          </p:cNvSpPr>
-          <p:nvPr>
-            <p:ph type="sldImg" idx="2"/>
-          </p:nvPr>
-        </p:nvSpPr>
-        <p:spPr>
-          <a:xfrm>
-            <a:off x="381000" y="685800"/>
-            <a:ext cx="6096000" cy="3429000"/>
-          </a:xfrm>
-          <a:custGeom>
-            <a:avLst/>
-            <a:gdLst/>
-            <a:ahLst/>
-            <a:cxnLst/>
-            <a:rect l="0" t="0" r="0" b="0"/>
-            <a:pathLst>
-              <a:path w="120000" h="120000" extrusionOk="0">
-                <a:moveTo>
-                  <a:pt x="0" y="0"/>
-                </a:moveTo>
-                <a:lnTo>
-                  <a:pt x="120000" y="0"/>
-                </a:lnTo>
-                <a:lnTo>
-                  <a:pt x="120000" y="120000"/>
-                </a:lnTo>
-                <a:lnTo>
-                  <a:pt x="0" y="120000"/>
-                </a:lnTo>
-                <a:close/>
-              </a:path>
-            </a:pathLst>
-          </a:custGeom>
-          <a:noFill/>
-          <a:ln w="9525" cap="flat" cmpd="sng">
-            <a:solidFill>
-              <a:srgbClr val="000000"/>
-            </a:solidFill>
-            <a:prstDash val="solid"/>
-            <a:round/>
-            <a:headEnd type="none" w="med" len="med"/>
-            <a:tailEnd type="none" w="med" len="med"/>
-          </a:ln>
-        </p:spPr>
-      </p:sp>
-      <p:sp>
-        <p:nvSpPr>
-          <p:cNvPr id="74" name="Shape 74"/>
           <p:cNvSpPr txBox="1">
             <a:spLocks noGrp="1"/>
           </p:cNvSpPr>
@@ -9840,6 +9843,96 @@
     </p:bg>
     <p:spTree>
       <p:nvGrpSpPr>
+        <p:cNvPr id="1" name="Shape 75"/>
+        <p:cNvGrpSpPr/>
+        <p:nvPr/>
+      </p:nvGrpSpPr>
+      <p:grpSpPr>
+        <a:xfrm>
+          <a:off x="0" y="0"/>
+          <a:ext cx="0" cy="0"/>
+          <a:chOff x="0" y="0"/>
+          <a:chExt cx="0" cy="0"/>
+        </a:xfrm>
+      </p:grpSpPr>
+      <p:sp>
+        <p:nvSpPr>
+          <p:cNvPr id="77" name="Shape 77"/>
+          <p:cNvSpPr txBox="1">
+            <a:spLocks noGrp="1"/>
+          </p:cNvSpPr>
+          <p:nvPr>
+            <p:ph type="title"/>
+          </p:nvPr>
+        </p:nvSpPr>
+        <p:spPr>
+          <a:xfrm>
+            <a:off x="3070033" y="2225929"/>
+            <a:ext cx="3048000" cy="670734"/>
+          </a:xfrm>
+          <a:prstGeom prst="rect">
+            <a:avLst/>
+          </a:prstGeom>
+        </p:spPr>
+        <p:txBody>
+          <a:bodyPr lIns="91425" tIns="91425" rIns="91425" bIns="91425" anchor="b" anchorCtr="0">
+            <a:noAutofit/>
+          </a:bodyPr>
+          <a:lstStyle/>
+          <a:p>
+            <a:pPr rtl="0">
+              <a:spcBef>
+                <a:spcPts val="0"/>
+              </a:spcBef>
+              <a:buNone/>
+            </a:pPr>
+            <a:endParaRPr lang="en" dirty="0"/>
+          </a:p>
+          <a:p>
+            <a:pPr>
+              <a:spcBef>
+                <a:spcPts val="0"/>
+              </a:spcBef>
+              <a:buNone/>
+            </a:pPr>
+            <a:r>
+              <a:rPr lang="en" sz="2800" dirty="0">
+                <a:latin typeface="+mj-lt"/>
+              </a:rPr>
+              <a:t>Demo</a:t>
+            </a:r>
+          </a:p>
+        </p:txBody>
+      </p:sp>
+    </p:spTree>
+  </p:cSld>
+  <p:clrMapOvr>
+    <a:masterClrMapping/>
+  </p:clrMapOvr>
+  <p:transition spd="slow">
+    <p:cut/>
+  </p:transition>
+</p:sld>
+</file>
+
+<file path=ppt/slides/slide6.xml><?xml version="1.0" encoding="utf-8"?>
+<p:sld xmlns:a="http://schemas.openxmlformats.org/drawingml/2006/main" xmlns:r="http://schemas.openxmlformats.org/officeDocument/2006/relationships" xmlns:p="http://schemas.openxmlformats.org/presentationml/2006/main">
+  <p:cSld>
+    <p:bg>
+      <p:bgPr>
+        <a:blipFill>
+          <a:blip r:embed="rId3">
+            <a:alphaModFix/>
+          </a:blip>
+          <a:stretch>
+            <a:fillRect/>
+          </a:stretch>
+        </a:blipFill>
+        <a:effectLst/>
+      </p:bgPr>
+    </p:bg>
+    <p:spTree>
+      <p:nvGrpSpPr>
         <p:cNvPr id="1" name="Shape 316"/>
         <p:cNvGrpSpPr/>
         <p:nvPr/>
@@ -10504,6 +10597,25 @@
                 <a:spcPts val="300"/>
               </a:spcAft>
             </a:pPr>
+            <a:endParaRPr lang="en-US" sz="2000" dirty="0">
+              <a:solidFill>
+                <a:schemeClr val="bg1"/>
+              </a:solidFill>
+              <a:latin typeface="+mn-lt"/>
+            </a:endParaRPr>
+          </a:p>
+          <a:p>
+            <a:pPr marL="342900" indent="-342900">
+              <a:lnSpc>
+                <a:spcPct val="150000"/>
+              </a:lnSpc>
+              <a:spcBef>
+                <a:spcPts val="300"/>
+              </a:spcBef>
+              <a:spcAft>
+                <a:spcPts val="300"/>
+              </a:spcAft>
+            </a:pPr>
             <a:r>
               <a:rPr lang="en-US" sz="2000" dirty="0">
                 <a:solidFill>
@@ -10526,6 +10638,25 @@
                 <a:spcPts val="300"/>
               </a:spcAft>
             </a:pPr>
+            <a:endParaRPr lang="en-US" sz="2000" dirty="0">
+              <a:solidFill>
+                <a:schemeClr val="bg1"/>
+              </a:solidFill>
+              <a:latin typeface="+mn-lt"/>
+            </a:endParaRPr>
+          </a:p>
+          <a:p>
+            <a:pPr marL="342900" indent="-342900">
+              <a:lnSpc>
+                <a:spcPct val="150000"/>
+              </a:lnSpc>
+              <a:spcBef>
+                <a:spcPts val="300"/>
+              </a:spcBef>
+              <a:spcAft>
+                <a:spcPts val="300"/>
+              </a:spcAft>
+            </a:pPr>
             <a:r>
               <a:rPr lang="en-US" sz="2000" dirty="0">
                 <a:solidFill>
@@ -10534,96 +10665,6 @@
                 <a:latin typeface="+mn-lt"/>
               </a:rPr>
               <a:t>Add comments to the bottom</a:t>
-            </a:r>
-          </a:p>
-        </p:txBody>
-      </p:sp>
-    </p:spTree>
-  </p:cSld>
-  <p:clrMapOvr>
-    <a:masterClrMapping/>
-  </p:clrMapOvr>
-  <p:transition spd="slow">
-    <p:cut/>
-  </p:transition>
-</p:sld>
-</file>
-
-<file path=ppt/slides/slide6.xml><?xml version="1.0" encoding="utf-8"?>
-<p:sld xmlns:a="http://schemas.openxmlformats.org/drawingml/2006/main" xmlns:r="http://schemas.openxmlformats.org/officeDocument/2006/relationships" xmlns:p="http://schemas.openxmlformats.org/presentationml/2006/main">
-  <p:cSld>
-    <p:bg>
-      <p:bgPr>
-        <a:blipFill>
-          <a:blip r:embed="rId3">
-            <a:alphaModFix/>
-          </a:blip>
-          <a:stretch>
-            <a:fillRect/>
-          </a:stretch>
-        </a:blipFill>
-        <a:effectLst/>
-      </p:bgPr>
-    </p:bg>
-    <p:spTree>
-      <p:nvGrpSpPr>
-        <p:cNvPr id="1" name="Shape 75"/>
-        <p:cNvGrpSpPr/>
-        <p:nvPr/>
-      </p:nvGrpSpPr>
-      <p:grpSpPr>
-        <a:xfrm>
-          <a:off x="0" y="0"/>
-          <a:ext cx="0" cy="0"/>
-          <a:chOff x="0" y="0"/>
-          <a:chExt cx="0" cy="0"/>
-        </a:xfrm>
-      </p:grpSpPr>
-      <p:sp>
-        <p:nvSpPr>
-          <p:cNvPr id="77" name="Shape 77"/>
-          <p:cNvSpPr txBox="1">
-            <a:spLocks noGrp="1"/>
-          </p:cNvSpPr>
-          <p:nvPr>
-            <p:ph type="title"/>
-          </p:nvPr>
-        </p:nvSpPr>
-        <p:spPr>
-          <a:xfrm>
-            <a:off x="3070033" y="2225929"/>
-            <a:ext cx="3048000" cy="670734"/>
-          </a:xfrm>
-          <a:prstGeom prst="rect">
-            <a:avLst/>
-          </a:prstGeom>
-        </p:spPr>
-        <p:txBody>
-          <a:bodyPr lIns="91425" tIns="91425" rIns="91425" bIns="91425" anchor="b" anchorCtr="0">
-            <a:noAutofit/>
-          </a:bodyPr>
-          <a:lstStyle/>
-          <a:p>
-            <a:pPr rtl="0">
-              <a:spcBef>
-                <a:spcPts val="0"/>
-              </a:spcBef>
-              <a:buNone/>
-            </a:pPr>
-            <a:endParaRPr lang="en" dirty="0"/>
-          </a:p>
-          <a:p>
-            <a:pPr>
-              <a:spcBef>
-                <a:spcPts val="0"/>
-              </a:spcBef>
-              <a:buNone/>
-            </a:pPr>
-            <a:r>
-              <a:rPr lang="en" sz="2800" dirty="0">
-                <a:latin typeface="+mj-lt"/>
-              </a:rPr>
-              <a:t>Demo</a:t>
             </a:r>
           </a:p>
         </p:txBody>
@@ -10765,8 +10806,8 @@
         </p:nvSpPr>
         <p:spPr>
           <a:xfrm>
-            <a:off x="815248" y="2192357"/>
-            <a:ext cx="6411818" cy="2951143"/>
+            <a:off x="815247" y="2192357"/>
+            <a:ext cx="6635419" cy="2951143"/>
           </a:xfrm>
           <a:prstGeom prst="rect">
             <a:avLst/>
@@ -11057,8 +11098,8 @@
         </p:nvSpPr>
         <p:spPr>
           <a:xfrm>
-            <a:off x="1107026" y="2366957"/>
-            <a:ext cx="6219190" cy="3076339"/>
+            <a:off x="815247" y="2280358"/>
+            <a:ext cx="6660439" cy="2703374"/>
           </a:xfrm>
           <a:prstGeom prst="rect">
             <a:avLst/>
@@ -11075,6 +11116,9 @@
           <a:lstStyle/>
           <a:p>
             <a:pPr marL="171450" lvl="0" indent="-171450" rtl="0">
+              <a:lnSpc>
+                <a:spcPct val="150000"/>
+              </a:lnSpc>
               <a:spcBef>
                 <a:spcPts val="600"/>
               </a:spcBef>
@@ -11094,23 +11138,14 @@
                 <a:cs typeface="Muli"/>
                 <a:sym typeface="Muli"/>
               </a:rPr>
-              <a:t>The</a:t>
-            </a:r>
-            <a:r>
-              <a:rPr lang="en" sz="2000" dirty="0">
-                <a:solidFill>
-                  <a:srgbClr val="FFFFFF"/>
-                </a:solidFill>
-                <a:latin typeface="+mn-lt"/>
-                <a:ea typeface="Muli"/>
-                <a:cs typeface="Muli"/>
-                <a:sym typeface="Muli"/>
-              </a:rPr>
-              <a:t> key factor in the DPLL algorithm that I implemented was the recursive call</a:t>
+              <a:t>Implementing most of the UI components without errors </a:t>
             </a:r>
           </a:p>
           <a:p>
-            <a:pPr marL="398463" lvl="4" indent="-171450">
+            <a:pPr marL="171450" lvl="0" indent="-171450" rtl="0">
+              <a:lnSpc>
+                <a:spcPct val="150000"/>
+              </a:lnSpc>
               <a:spcBef>
                 <a:spcPts val="600"/>
               </a:spcBef>
@@ -11130,11 +11165,23 @@
                 <a:cs typeface="Muli"/>
                 <a:sym typeface="Muli"/>
               </a:rPr>
-              <a:t>Recursive call is what makes the system works</a:t>
+              <a:t>Had immense difficulty with JavaScript libraries and conflicting CSS</a:t>
             </a:r>
+            <a:endParaRPr lang="en" sz="2000" dirty="0">
+              <a:solidFill>
+                <a:srgbClr val="FFFFFF"/>
+              </a:solidFill>
+              <a:latin typeface="+mn-lt"/>
+              <a:ea typeface="Muli"/>
+              <a:cs typeface="Muli"/>
+              <a:sym typeface="Muli"/>
+            </a:endParaRPr>
           </a:p>
           <a:p>
-            <a:pPr marL="398463" lvl="4" indent="-171450">
+            <a:pPr marL="171450" lvl="0" indent="-171450" rtl="0">
+              <a:lnSpc>
+                <a:spcPct val="150000"/>
+              </a:lnSpc>
               <a:spcBef>
                 <a:spcPts val="600"/>
               </a:spcBef>
@@ -11145,7 +11192,7 @@
               <a:buChar char="•"/>
             </a:pPr>
             <a:r>
-              <a:rPr lang="en-US" sz="2000" dirty="0">
+              <a:rPr lang="en" sz="2000" dirty="0">
                 <a:solidFill>
                   <a:srgbClr val="FFFFFF"/>
                 </a:solidFill>
@@ -11154,20 +11201,8 @@
                 <a:cs typeface="Muli"/>
                 <a:sym typeface="Muli"/>
               </a:rPr>
-              <a:t>It was coded in Java</a:t>
+              <a:t>Anot</a:t>
             </a:r>
-          </a:p>
-          <a:p>
-            <a:pPr marL="171450" lvl="4" indent="-171450">
-              <a:spcBef>
-                <a:spcPts val="600"/>
-              </a:spcBef>
-              <a:spcAft>
-                <a:spcPts val="600"/>
-              </a:spcAft>
-              <a:buFont typeface="Arial" panose="020B0604020202020204" pitchFamily="34" charset="0"/>
-              <a:buChar char="•"/>
-            </a:pPr>
             <a:r>
               <a:rPr lang="en-US" sz="2000" dirty="0">
                 <a:solidFill>
@@ -11178,41 +11213,8 @@
                 <a:cs typeface="Muli"/>
                 <a:sym typeface="Muli"/>
               </a:rPr>
-              <a:t>I tried to implement the MINISAT</a:t>
+              <a:t>her difficulty is organizing code and ensure all components are working</a:t>
             </a:r>
-          </a:p>
-          <a:p>
-            <a:pPr marL="396875" lvl="5" indent="-171450">
-              <a:spcBef>
-                <a:spcPts val="600"/>
-              </a:spcBef>
-              <a:spcAft>
-                <a:spcPts val="600"/>
-              </a:spcAft>
-              <a:buFont typeface="Arial" panose="020B0604020202020204" pitchFamily="34" charset="0"/>
-              <a:buChar char="•"/>
-            </a:pPr>
-            <a:r>
-              <a:rPr lang="en-US" sz="2000" dirty="0">
-                <a:solidFill>
-                  <a:srgbClr val="FFFFFF"/>
-                </a:solidFill>
-                <a:latin typeface="+mn-lt"/>
-                <a:ea typeface="Muli"/>
-                <a:cs typeface="Muli"/>
-                <a:sym typeface="Muli"/>
-              </a:rPr>
-              <a:t>Complicated</a:t>
-            </a:r>
-            <a:endParaRPr lang="en" sz="2000" dirty="0">
-              <a:solidFill>
-                <a:srgbClr val="FFFFFF"/>
-              </a:solidFill>
-              <a:latin typeface="+mn-lt"/>
-              <a:ea typeface="Muli"/>
-              <a:cs typeface="Muli"/>
-              <a:sym typeface="Muli"/>
-            </a:endParaRPr>
           </a:p>
         </p:txBody>
       </p:sp>
@@ -11811,49 +11813,8 @@
                 <a:ea typeface="Muli"/>
                 <a:cs typeface="Muli"/>
               </a:rPr>
-              <a:t>There were factors in </a:t>
+              <a:t>The project is still under constructing – implementing the last homework assignment into the UI and making minor changes throughout</a:t>
             </a:r>
-            <a:r>
-              <a:rPr lang="en-US" sz="2000" dirty="0" err="1">
-                <a:solidFill>
-                  <a:srgbClr val="FFFFFF"/>
-                </a:solidFill>
-                <a:latin typeface="+mn-lt"/>
-                <a:ea typeface="Muli"/>
-                <a:cs typeface="Muli"/>
-              </a:rPr>
-              <a:t>MySat</a:t>
-            </a:r>
-            <a:r>
-              <a:rPr lang="en-US" sz="2000" dirty="0">
-                <a:solidFill>
-                  <a:srgbClr val="FFFFFF"/>
-                </a:solidFill>
-                <a:latin typeface="+mn-lt"/>
-                <a:ea typeface="Muli"/>
-                <a:cs typeface="Muli"/>
-              </a:rPr>
-              <a:t> that made it significantly different from </a:t>
-            </a:r>
-            <a:r>
-              <a:rPr lang="en-US" sz="2000" dirty="0" err="1">
-                <a:solidFill>
-                  <a:srgbClr val="FFFFFF"/>
-                </a:solidFill>
-                <a:latin typeface="+mn-lt"/>
-                <a:ea typeface="Muli"/>
-                <a:cs typeface="Muli"/>
-              </a:rPr>
-              <a:t>MiniSat</a:t>
-            </a:r>
-            <a:endParaRPr lang="en-US" sz="2000" dirty="0">
-              <a:solidFill>
-                <a:srgbClr val="FFFFFF"/>
-              </a:solidFill>
-              <a:latin typeface="+mn-lt"/>
-              <a:ea typeface="Muli"/>
-              <a:cs typeface="Muli"/>
-            </a:endParaRPr>
           </a:p>
           <a:p>
             <a:pPr marL="342900" lvl="0" indent="-342900">
@@ -11875,52 +11836,11 @@
                 <a:ea typeface="Muli"/>
                 <a:cs typeface="Muli"/>
               </a:rPr>
-              <a:t>If time allowed, I could have implemented features shown in the </a:t>
+              <a:t>Learn how JavaScript can complicate the implementation of the UI</a:t>
             </a:r>
-            <a:r>
-              <a:rPr lang="en-US" sz="2000" dirty="0" err="1">
-                <a:solidFill>
-                  <a:srgbClr val="FFFFFF"/>
-                </a:solidFill>
-                <a:latin typeface="+mn-lt"/>
-                <a:ea typeface="Muli"/>
-                <a:cs typeface="Muli"/>
-              </a:rPr>
-              <a:t>MiniSat</a:t>
-            </a:r>
-            <a:r>
-              <a:rPr lang="en-US" sz="2000" dirty="0">
-                <a:solidFill>
-                  <a:srgbClr val="FFFFFF"/>
-                </a:solidFill>
-                <a:latin typeface="+mn-lt"/>
-                <a:ea typeface="Muli"/>
-                <a:cs typeface="Muli"/>
-              </a:rPr>
-              <a:t> to </a:t>
-            </a:r>
-            <a:r>
-              <a:rPr lang="en-US" sz="2000" dirty="0" err="1">
-                <a:solidFill>
-                  <a:srgbClr val="FFFFFF"/>
-                </a:solidFill>
-                <a:latin typeface="+mn-lt"/>
-                <a:ea typeface="Muli"/>
-                <a:cs typeface="Muli"/>
-              </a:rPr>
-              <a:t>MySat</a:t>
-            </a:r>
-            <a:endParaRPr lang="en-US" sz="2000" dirty="0">
-              <a:solidFill>
-                <a:srgbClr val="FFFFFF"/>
-              </a:solidFill>
-              <a:latin typeface="+mn-lt"/>
-              <a:ea typeface="Muli"/>
-              <a:cs typeface="Muli"/>
-            </a:endParaRPr>
           </a:p>
           <a:p>
-            <a:pPr marL="342900" indent="-342900">
+            <a:pPr marL="342900" lvl="0" indent="-342900">
               <a:spcBef>
                 <a:spcPts val="600"/>
               </a:spcBef>
@@ -11935,10 +11855,11 @@
                 <a:solidFill>
                   <a:srgbClr val="FFFFFF"/>
                 </a:solidFill>
+                <a:latin typeface="+mn-lt"/>
                 <a:ea typeface="Muli"/>
                 <a:cs typeface="Muli"/>
               </a:rPr>
-              <a:t>I was able to understand the process of building build a large system</a:t>
+              <a:t>Give </a:t>
             </a:r>
           </a:p>
         </p:txBody>
@@ -11951,6 +11872,564 @@
   <p:transition spd="slow">
     <p:cut/>
   </p:transition>
+</p:sld>
+</file>
+
+<file path=ppt/slides/slide9.xml><?xml version="1.0" encoding="utf-8"?>
+<p:sld xmlns:a="http://schemas.openxmlformats.org/drawingml/2006/main" xmlns:r="http://schemas.openxmlformats.org/officeDocument/2006/relationships" xmlns:p="http://schemas.openxmlformats.org/presentationml/2006/main">
+  <p:cSld>
+    <p:spTree>
+      <p:nvGrpSpPr>
+        <p:cNvPr id="1" name=""/>
+        <p:cNvGrpSpPr/>
+        <p:nvPr/>
+      </p:nvGrpSpPr>
+      <p:grpSpPr>
+        <a:xfrm>
+          <a:off x="0" y="0"/>
+          <a:ext cx="0" cy="0"/>
+          <a:chOff x="0" y="0"/>
+          <a:chExt cx="0" cy="0"/>
+        </a:xfrm>
+      </p:grpSpPr>
+      <p:sp>
+        <p:nvSpPr>
+          <p:cNvPr id="4" name="Shape 425"/>
+          <p:cNvSpPr txBox="1">
+            <a:spLocks/>
+          </p:cNvSpPr>
+          <p:nvPr/>
+        </p:nvSpPr>
+        <p:spPr>
+          <a:xfrm>
+            <a:off x="1187268" y="857957"/>
+            <a:ext cx="6793976" cy="2923821"/>
+          </a:xfrm>
+          <a:prstGeom prst="rect">
+            <a:avLst/>
+          </a:prstGeom>
+          <a:solidFill>
+            <a:srgbClr val="00B2FF">
+              <a:alpha val="73330"/>
+            </a:srgbClr>
+          </a:solidFill>
+          <a:ln>
+            <a:noFill/>
+          </a:ln>
+        </p:spPr>
+        <p:txBody>
+          <a:bodyPr lIns="91425" tIns="91425" rIns="91425" bIns="91425" anchor="t" anchorCtr="0">
+            <a:noAutofit/>
+          </a:bodyPr>
+          <a:lstStyle>
+            <a:defPPr marR="0" algn="l" rtl="0">
+              <a:lnSpc>
+                <a:spcPct val="100000"/>
+              </a:lnSpc>
+              <a:spcBef>
+                <a:spcPts val="0"/>
+              </a:spcBef>
+              <a:spcAft>
+                <a:spcPts val="0"/>
+              </a:spcAft>
+            </a:defPPr>
+            <a:lvl1pPr marR="0" algn="l" rtl="0">
+              <a:lnSpc>
+                <a:spcPct val="100000"/>
+              </a:lnSpc>
+              <a:spcBef>
+                <a:spcPts val="0"/>
+              </a:spcBef>
+              <a:spcAft>
+                <a:spcPts val="0"/>
+              </a:spcAft>
+              <a:buNone/>
+              <a:defRPr sz="1400" b="0" i="0" u="none" strike="noStrike" cap="none" baseline="0">
+                <a:solidFill>
+                  <a:srgbClr val="000000"/>
+                </a:solidFill>
+                <a:latin typeface="Arial"/>
+                <a:ea typeface="Arial"/>
+                <a:cs typeface="Arial"/>
+                <a:sym typeface="Arial"/>
+                <a:rtl val="0"/>
+              </a:defRPr>
+            </a:lvl1pPr>
+            <a:lvl2pPr marR="0" algn="l" rtl="0">
+              <a:lnSpc>
+                <a:spcPct val="100000"/>
+              </a:lnSpc>
+              <a:spcBef>
+                <a:spcPts val="0"/>
+              </a:spcBef>
+              <a:spcAft>
+                <a:spcPts val="0"/>
+              </a:spcAft>
+              <a:buNone/>
+              <a:defRPr sz="1400" b="0" i="0" u="none" strike="noStrike" cap="none" baseline="0">
+                <a:solidFill>
+                  <a:srgbClr val="000000"/>
+                </a:solidFill>
+                <a:latin typeface="Arial"/>
+                <a:ea typeface="Arial"/>
+                <a:cs typeface="Arial"/>
+                <a:sym typeface="Arial"/>
+                <a:rtl val="0"/>
+              </a:defRPr>
+            </a:lvl2pPr>
+            <a:lvl3pPr marR="0" algn="l" rtl="0">
+              <a:lnSpc>
+                <a:spcPct val="100000"/>
+              </a:lnSpc>
+              <a:spcBef>
+                <a:spcPts val="0"/>
+              </a:spcBef>
+              <a:spcAft>
+                <a:spcPts val="0"/>
+              </a:spcAft>
+              <a:buNone/>
+              <a:defRPr sz="1400" b="0" i="0" u="none" strike="noStrike" cap="none" baseline="0">
+                <a:solidFill>
+                  <a:srgbClr val="000000"/>
+                </a:solidFill>
+                <a:latin typeface="Arial"/>
+                <a:ea typeface="Arial"/>
+                <a:cs typeface="Arial"/>
+                <a:sym typeface="Arial"/>
+                <a:rtl val="0"/>
+              </a:defRPr>
+            </a:lvl3pPr>
+            <a:lvl4pPr marR="0" algn="l" rtl="0">
+              <a:lnSpc>
+                <a:spcPct val="100000"/>
+              </a:lnSpc>
+              <a:spcBef>
+                <a:spcPts val="0"/>
+              </a:spcBef>
+              <a:spcAft>
+                <a:spcPts val="0"/>
+              </a:spcAft>
+              <a:buNone/>
+              <a:defRPr sz="1400" b="0" i="0" u="none" strike="noStrike" cap="none" baseline="0">
+                <a:solidFill>
+                  <a:srgbClr val="000000"/>
+                </a:solidFill>
+                <a:latin typeface="Arial"/>
+                <a:ea typeface="Arial"/>
+                <a:cs typeface="Arial"/>
+                <a:sym typeface="Arial"/>
+                <a:rtl val="0"/>
+              </a:defRPr>
+            </a:lvl4pPr>
+            <a:lvl5pPr marR="0" algn="l" rtl="0">
+              <a:lnSpc>
+                <a:spcPct val="100000"/>
+              </a:lnSpc>
+              <a:spcBef>
+                <a:spcPts val="0"/>
+              </a:spcBef>
+              <a:spcAft>
+                <a:spcPts val="0"/>
+              </a:spcAft>
+              <a:buNone/>
+              <a:defRPr sz="1400" b="0" i="0" u="none" strike="noStrike" cap="none" baseline="0">
+                <a:solidFill>
+                  <a:srgbClr val="000000"/>
+                </a:solidFill>
+                <a:latin typeface="Arial"/>
+                <a:ea typeface="Arial"/>
+                <a:cs typeface="Arial"/>
+                <a:sym typeface="Arial"/>
+                <a:rtl val="0"/>
+              </a:defRPr>
+            </a:lvl5pPr>
+            <a:lvl6pPr marR="0" algn="l" rtl="0">
+              <a:lnSpc>
+                <a:spcPct val="100000"/>
+              </a:lnSpc>
+              <a:spcBef>
+                <a:spcPts val="0"/>
+              </a:spcBef>
+              <a:spcAft>
+                <a:spcPts val="0"/>
+              </a:spcAft>
+              <a:buNone/>
+              <a:defRPr sz="1400" b="0" i="0" u="none" strike="noStrike" cap="none" baseline="0">
+                <a:solidFill>
+                  <a:srgbClr val="000000"/>
+                </a:solidFill>
+                <a:latin typeface="Arial"/>
+                <a:ea typeface="Arial"/>
+                <a:cs typeface="Arial"/>
+                <a:sym typeface="Arial"/>
+                <a:rtl val="0"/>
+              </a:defRPr>
+            </a:lvl6pPr>
+            <a:lvl7pPr marR="0" algn="l" rtl="0">
+              <a:lnSpc>
+                <a:spcPct val="100000"/>
+              </a:lnSpc>
+              <a:spcBef>
+                <a:spcPts val="0"/>
+              </a:spcBef>
+              <a:spcAft>
+                <a:spcPts val="0"/>
+              </a:spcAft>
+              <a:buNone/>
+              <a:defRPr sz="1400" b="0" i="0" u="none" strike="noStrike" cap="none" baseline="0">
+                <a:solidFill>
+                  <a:srgbClr val="000000"/>
+                </a:solidFill>
+                <a:latin typeface="Arial"/>
+                <a:ea typeface="Arial"/>
+                <a:cs typeface="Arial"/>
+                <a:sym typeface="Arial"/>
+                <a:rtl val="0"/>
+              </a:defRPr>
+            </a:lvl7pPr>
+            <a:lvl8pPr marR="0" algn="l" rtl="0">
+              <a:lnSpc>
+                <a:spcPct val="100000"/>
+              </a:lnSpc>
+              <a:spcBef>
+                <a:spcPts val="0"/>
+              </a:spcBef>
+              <a:spcAft>
+                <a:spcPts val="0"/>
+              </a:spcAft>
+              <a:buNone/>
+              <a:defRPr sz="1400" b="0" i="0" u="none" strike="noStrike" cap="none" baseline="0">
+                <a:solidFill>
+                  <a:srgbClr val="000000"/>
+                </a:solidFill>
+                <a:latin typeface="Arial"/>
+                <a:ea typeface="Arial"/>
+                <a:cs typeface="Arial"/>
+                <a:sym typeface="Arial"/>
+                <a:rtl val="0"/>
+              </a:defRPr>
+            </a:lvl8pPr>
+            <a:lvl9pPr marR="0" algn="l" rtl="0">
+              <a:lnSpc>
+                <a:spcPct val="100000"/>
+              </a:lnSpc>
+              <a:spcBef>
+                <a:spcPts val="0"/>
+              </a:spcBef>
+              <a:spcAft>
+                <a:spcPts val="0"/>
+              </a:spcAft>
+              <a:buNone/>
+              <a:defRPr sz="1400" b="0" i="0" u="none" strike="noStrike" cap="none" baseline="0">
+                <a:solidFill>
+                  <a:srgbClr val="000000"/>
+                </a:solidFill>
+                <a:latin typeface="Arial"/>
+                <a:ea typeface="Arial"/>
+                <a:cs typeface="Arial"/>
+                <a:sym typeface="Arial"/>
+                <a:rtl val="0"/>
+              </a:defRPr>
+            </a:lvl9pPr>
+          </a:lstStyle>
+          <a:p>
+            <a:pPr algn="ctr"/>
+            <a:endParaRPr lang="en-US" sz="2400" b="1" dirty="0">
+              <a:solidFill>
+                <a:srgbClr val="FFFFFF"/>
+              </a:solidFill>
+              <a:latin typeface="Muli"/>
+              <a:ea typeface="Muli"/>
+              <a:cs typeface="Muli"/>
+              <a:sym typeface="Muli"/>
+            </a:endParaRPr>
+          </a:p>
+          <a:p>
+            <a:pPr algn="ctr"/>
+            <a:endParaRPr lang="en-US" sz="2400" b="1" dirty="0">
+              <a:solidFill>
+                <a:srgbClr val="FFFFFF"/>
+              </a:solidFill>
+              <a:latin typeface="Muli"/>
+              <a:ea typeface="Muli"/>
+              <a:cs typeface="Muli"/>
+              <a:sym typeface="Muli"/>
+            </a:endParaRPr>
+          </a:p>
+          <a:p>
+            <a:pPr algn="ctr"/>
+            <a:r>
+              <a:rPr lang="en-US" sz="2400" b="1" dirty="0">
+                <a:solidFill>
+                  <a:srgbClr val="FFFFFF"/>
+                </a:solidFill>
+                <a:latin typeface="Muli"/>
+                <a:ea typeface="Muli"/>
+                <a:cs typeface="Muli"/>
+                <a:sym typeface="Muli"/>
+              </a:rPr>
+              <a:t>Any questions?</a:t>
+            </a:r>
+          </a:p>
+          <a:p>
+            <a:pPr algn="ctr"/>
+            <a:endParaRPr lang="en-US" dirty="0">
+              <a:solidFill>
+                <a:srgbClr val="FFFFFF"/>
+              </a:solidFill>
+              <a:latin typeface="Muli"/>
+              <a:ea typeface="Muli"/>
+              <a:cs typeface="Muli"/>
+              <a:sym typeface="Muli"/>
+            </a:endParaRPr>
+          </a:p>
+          <a:p>
+            <a:pPr algn="ctr"/>
+            <a:r>
+              <a:rPr lang="en-US" dirty="0" err="1">
+                <a:solidFill>
+                  <a:srgbClr val="FFFFFF"/>
+                </a:solidFill>
+                <a:latin typeface="Muli"/>
+                <a:ea typeface="Muli"/>
+                <a:cs typeface="Muli"/>
+                <a:sym typeface="Muli"/>
+              </a:rPr>
+              <a:t>Github</a:t>
+            </a:r>
+            <a:r>
+              <a:rPr lang="en-US" dirty="0">
+                <a:solidFill>
+                  <a:srgbClr val="FFFFFF"/>
+                </a:solidFill>
+                <a:latin typeface="Muli"/>
+                <a:ea typeface="Muli"/>
+                <a:cs typeface="Muli"/>
+                <a:sym typeface="Muli"/>
+              </a:rPr>
+              <a:t> Information:</a:t>
+            </a:r>
+          </a:p>
+          <a:p>
+            <a:pPr algn="ctr"/>
+            <a:r>
+              <a:rPr lang="en-US" dirty="0">
+                <a:solidFill>
+                  <a:srgbClr val="FFFFFF"/>
+                </a:solidFill>
+                <a:latin typeface="Muli"/>
+                <a:ea typeface="Muli"/>
+                <a:cs typeface="Muli"/>
+                <a:sym typeface="Muli"/>
+              </a:rPr>
+              <a:t>https://github.com/sgramajo/compilerProject</a:t>
+            </a:r>
+          </a:p>
+        </p:txBody>
+      </p:sp>
+      <p:sp>
+        <p:nvSpPr>
+          <p:cNvPr id="3" name="Shape 424"/>
+          <p:cNvSpPr txBox="1">
+            <a:spLocks/>
+          </p:cNvSpPr>
+          <p:nvPr/>
+        </p:nvSpPr>
+        <p:spPr>
+          <a:xfrm>
+            <a:off x="1085669" y="235653"/>
+            <a:ext cx="6771397" cy="1309511"/>
+          </a:xfrm>
+          <a:prstGeom prst="rect">
+            <a:avLst/>
+          </a:prstGeom>
+          <a:noFill/>
+          <a:ln>
+            <a:noFill/>
+          </a:ln>
+        </p:spPr>
+        <p:txBody>
+          <a:bodyPr lIns="91425" tIns="91425" rIns="91425" bIns="91425" anchor="b" anchorCtr="0">
+            <a:noAutofit/>
+          </a:bodyPr>
+          <a:lstStyle>
+            <a:defPPr marR="0" algn="l" rtl="0">
+              <a:lnSpc>
+                <a:spcPct val="100000"/>
+              </a:lnSpc>
+              <a:spcBef>
+                <a:spcPts val="0"/>
+              </a:spcBef>
+              <a:spcAft>
+                <a:spcPts val="0"/>
+              </a:spcAft>
+            </a:defPPr>
+            <a:lvl1pPr marR="0" algn="l" rtl="0">
+              <a:lnSpc>
+                <a:spcPct val="100000"/>
+              </a:lnSpc>
+              <a:spcBef>
+                <a:spcPts val="0"/>
+              </a:spcBef>
+              <a:spcAft>
+                <a:spcPts val="0"/>
+              </a:spcAft>
+              <a:buNone/>
+              <a:defRPr sz="1800" b="1" i="0" u="none" strike="noStrike" cap="none" baseline="0">
+                <a:solidFill>
+                  <a:srgbClr val="FFFFFF"/>
+                </a:solidFill>
+                <a:latin typeface="Muli"/>
+                <a:ea typeface="Muli"/>
+                <a:cs typeface="Muli"/>
+                <a:sym typeface="Muli"/>
+                <a:rtl val="0"/>
+              </a:defRPr>
+            </a:lvl1pPr>
+            <a:lvl2pPr rtl="0">
+              <a:spcBef>
+                <a:spcPts val="0"/>
+              </a:spcBef>
+              <a:buNone/>
+              <a:defRPr sz="1800" b="1">
+                <a:solidFill>
+                  <a:srgbClr val="FFFFFF"/>
+                </a:solidFill>
+                <a:latin typeface="Muli"/>
+                <a:ea typeface="Muli"/>
+                <a:cs typeface="Muli"/>
+                <a:sym typeface="Muli"/>
+              </a:defRPr>
+            </a:lvl2pPr>
+            <a:lvl3pPr rtl="0">
+              <a:spcBef>
+                <a:spcPts val="0"/>
+              </a:spcBef>
+              <a:buNone/>
+              <a:defRPr sz="1800" b="1">
+                <a:solidFill>
+                  <a:srgbClr val="FFFFFF"/>
+                </a:solidFill>
+                <a:latin typeface="Muli"/>
+                <a:ea typeface="Muli"/>
+                <a:cs typeface="Muli"/>
+                <a:sym typeface="Muli"/>
+              </a:defRPr>
+            </a:lvl3pPr>
+            <a:lvl4pPr rtl="0">
+              <a:spcBef>
+                <a:spcPts val="0"/>
+              </a:spcBef>
+              <a:buNone/>
+              <a:defRPr sz="1800" b="1">
+                <a:solidFill>
+                  <a:srgbClr val="FFFFFF"/>
+                </a:solidFill>
+                <a:latin typeface="Muli"/>
+                <a:ea typeface="Muli"/>
+                <a:cs typeface="Muli"/>
+                <a:sym typeface="Muli"/>
+              </a:defRPr>
+            </a:lvl4pPr>
+            <a:lvl5pPr rtl="0">
+              <a:spcBef>
+                <a:spcPts val="0"/>
+              </a:spcBef>
+              <a:buNone/>
+              <a:defRPr sz="1800" b="1">
+                <a:solidFill>
+                  <a:srgbClr val="FFFFFF"/>
+                </a:solidFill>
+                <a:latin typeface="Muli"/>
+                <a:ea typeface="Muli"/>
+                <a:cs typeface="Muli"/>
+                <a:sym typeface="Muli"/>
+              </a:defRPr>
+            </a:lvl5pPr>
+            <a:lvl6pPr rtl="0">
+              <a:spcBef>
+                <a:spcPts val="0"/>
+              </a:spcBef>
+              <a:buNone/>
+              <a:defRPr sz="1800" b="1">
+                <a:solidFill>
+                  <a:srgbClr val="FFFFFF"/>
+                </a:solidFill>
+                <a:latin typeface="Muli"/>
+                <a:ea typeface="Muli"/>
+                <a:cs typeface="Muli"/>
+                <a:sym typeface="Muli"/>
+              </a:defRPr>
+            </a:lvl6pPr>
+            <a:lvl7pPr rtl="0">
+              <a:spcBef>
+                <a:spcPts val="0"/>
+              </a:spcBef>
+              <a:buNone/>
+              <a:defRPr sz="1800" b="1">
+                <a:solidFill>
+                  <a:srgbClr val="FFFFFF"/>
+                </a:solidFill>
+                <a:latin typeface="Muli"/>
+                <a:ea typeface="Muli"/>
+                <a:cs typeface="Muli"/>
+                <a:sym typeface="Muli"/>
+              </a:defRPr>
+            </a:lvl7pPr>
+            <a:lvl8pPr rtl="0">
+              <a:spcBef>
+                <a:spcPts val="0"/>
+              </a:spcBef>
+              <a:buNone/>
+              <a:defRPr sz="1800" b="1">
+                <a:solidFill>
+                  <a:srgbClr val="FFFFFF"/>
+                </a:solidFill>
+                <a:latin typeface="Muli"/>
+                <a:ea typeface="Muli"/>
+                <a:cs typeface="Muli"/>
+                <a:sym typeface="Muli"/>
+              </a:defRPr>
+            </a:lvl8pPr>
+            <a:lvl9pPr rtl="0">
+              <a:spcBef>
+                <a:spcPts val="0"/>
+              </a:spcBef>
+              <a:buNone/>
+              <a:defRPr sz="1800" b="1">
+                <a:solidFill>
+                  <a:srgbClr val="FFFFFF"/>
+                </a:solidFill>
+                <a:latin typeface="Muli"/>
+                <a:ea typeface="Muli"/>
+                <a:cs typeface="Muli"/>
+                <a:sym typeface="Muli"/>
+              </a:defRPr>
+            </a:lvl9pPr>
+          </a:lstStyle>
+          <a:p>
+            <a:pPr algn="ctr"/>
+            <a:r>
+              <a:rPr lang="en" sz="8800" dirty="0">
+                <a:solidFill>
+                  <a:schemeClr val="bg1"/>
+                </a:solidFill>
+              </a:rPr>
+              <a:t>Thanks!</a:t>
+            </a:r>
+          </a:p>
+        </p:txBody>
+      </p:sp>
+    </p:spTree>
+    <p:extLst>
+      <p:ext uri="{BB962C8B-B14F-4D97-AF65-F5344CB8AC3E}">
+        <p14:creationId xmlns:p14="http://schemas.microsoft.com/office/powerpoint/2010/main" val="66550863"/>
+      </p:ext>
+    </p:extLst>
+  </p:cSld>
+  <p:clrMapOvr>
+    <a:masterClrMapping/>
+  </p:clrMapOvr>
 </p:sld>
 </file>
 

</xml_diff>

<commit_message>
Finished Parser/Vitual Machine and Tutorial Section
</commit_message>
<xml_diff>
--- a/Final Project.pptx
+++ b/Final Project.pptx
@@ -820,6 +820,379 @@
             <a:noAutofit/>
           </a:bodyPr>
           <a:lstStyle/>
+          <a:p>
+            <a:pPr algn="ctr"/>
+            <a:r>
+              <a:rPr lang="en-US" sz="1100" b="1" dirty="0">
+                <a:solidFill>
+                  <a:srgbClr val="FFFFFF"/>
+                </a:solidFill>
+                <a:latin typeface="+mn-lt"/>
+                <a:sym typeface="Muli"/>
+              </a:rPr>
+              <a:t>To create a new web application</a:t>
+            </a:r>
+          </a:p>
+          <a:p>
+            <a:pPr marL="457200" indent="-457200">
+              <a:buFont typeface="+mj-lt"/>
+              <a:buAutoNum type="arabicPeriod"/>
+            </a:pPr>
+            <a:r>
+              <a:rPr lang="en-US" sz="1100" b="1" dirty="0" err="1">
+                <a:solidFill>
+                  <a:srgbClr val="FFFFFF"/>
+                </a:solidFill>
+                <a:latin typeface="+mn-lt"/>
+                <a:sym typeface="Muli"/>
+              </a:rPr>
+              <a:t>NodeJS</a:t>
+            </a:r>
+            <a:r>
+              <a:rPr lang="en-US" sz="1100" dirty="0">
+                <a:solidFill>
+                  <a:srgbClr val="FFFFFF"/>
+                </a:solidFill>
+                <a:latin typeface="+mn-lt"/>
+                <a:sym typeface="Muli"/>
+              </a:rPr>
+              <a:t> – this will initiate everything you need first</a:t>
+            </a:r>
+          </a:p>
+          <a:p>
+            <a:pPr marL="801688" indent="-342900">
+              <a:buFont typeface="Arial" panose="020B0604020202020204" pitchFamily="34" charset="0"/>
+              <a:buChar char="•"/>
+            </a:pPr>
+            <a:r>
+              <a:rPr lang="en-US" sz="1100" dirty="0" err="1">
+                <a:solidFill>
+                  <a:srgbClr val="FFFFFF"/>
+                </a:solidFill>
+                <a:latin typeface="+mn-lt"/>
+                <a:sym typeface="Muli"/>
+              </a:rPr>
+              <a:t>Mkdir</a:t>
+            </a:r>
+            <a:r>
+              <a:rPr lang="en-US" sz="1100" dirty="0">
+                <a:solidFill>
+                  <a:srgbClr val="FFFFFF"/>
+                </a:solidFill>
+                <a:latin typeface="+mn-lt"/>
+                <a:sym typeface="Muli"/>
+              </a:rPr>
+              <a:t> [name of directory]</a:t>
+            </a:r>
+          </a:p>
+          <a:p>
+            <a:pPr marL="801688" indent="-342900">
+              <a:buFont typeface="Arial" panose="020B0604020202020204" pitchFamily="34" charset="0"/>
+              <a:buChar char="•"/>
+            </a:pPr>
+            <a:r>
+              <a:rPr lang="en-US" sz="1100" dirty="0">
+                <a:solidFill>
+                  <a:srgbClr val="FFFFFF"/>
+                </a:solidFill>
+                <a:latin typeface="+mn-lt"/>
+                <a:sym typeface="Muli"/>
+              </a:rPr>
+              <a:t>Cd [name of directory]</a:t>
+            </a:r>
+          </a:p>
+          <a:p>
+            <a:pPr marL="801688" indent="-342900">
+              <a:buFont typeface="Arial" panose="020B0604020202020204" pitchFamily="34" charset="0"/>
+              <a:buChar char="•"/>
+            </a:pPr>
+            <a:r>
+              <a:rPr lang="en-US" sz="1100" dirty="0" err="1">
+                <a:solidFill>
+                  <a:srgbClr val="FFFFFF"/>
+                </a:solidFill>
+                <a:latin typeface="+mn-lt"/>
+                <a:sym typeface="Muli"/>
+              </a:rPr>
+              <a:t>Npm</a:t>
+            </a:r>
+            <a:r>
+              <a:rPr lang="en-US" sz="1100" dirty="0">
+                <a:solidFill>
+                  <a:srgbClr val="FFFFFF"/>
+                </a:solidFill>
+                <a:latin typeface="+mn-lt"/>
+                <a:sym typeface="Muli"/>
+              </a:rPr>
+              <a:t> </a:t>
+            </a:r>
+            <a:r>
+              <a:rPr lang="en-US" sz="1100" dirty="0" err="1">
+                <a:solidFill>
+                  <a:srgbClr val="FFFFFF"/>
+                </a:solidFill>
+                <a:latin typeface="+mn-lt"/>
+                <a:sym typeface="Muli"/>
+              </a:rPr>
+              <a:t>init</a:t>
+            </a:r>
+            <a:endParaRPr lang="en-US" sz="1100" dirty="0">
+              <a:solidFill>
+                <a:srgbClr val="FFFFFF"/>
+              </a:solidFill>
+              <a:latin typeface="+mn-lt"/>
+              <a:sym typeface="Muli"/>
+            </a:endParaRPr>
+          </a:p>
+          <a:p>
+            <a:pPr marL="801688" indent="-342900">
+              <a:buFont typeface="Arial" panose="020B0604020202020204" pitchFamily="34" charset="0"/>
+              <a:buChar char="•"/>
+            </a:pPr>
+            <a:r>
+              <a:rPr lang="en-US" sz="1100" dirty="0">
+                <a:solidFill>
+                  <a:srgbClr val="FFFFFF"/>
+                </a:solidFill>
+                <a:latin typeface="+mn-lt"/>
+                <a:sym typeface="Muli"/>
+              </a:rPr>
+              <a:t>(optional – if you want to build your own server) </a:t>
+            </a:r>
+            <a:r>
+              <a:rPr lang="en-US" sz="1100" dirty="0" err="1">
+                <a:solidFill>
+                  <a:srgbClr val="FFFFFF"/>
+                </a:solidFill>
+                <a:latin typeface="+mn-lt"/>
+                <a:sym typeface="Muli"/>
+              </a:rPr>
+              <a:t>Npm</a:t>
+            </a:r>
+            <a:r>
+              <a:rPr lang="en-US" sz="1100" dirty="0">
+                <a:solidFill>
+                  <a:srgbClr val="FFFFFF"/>
+                </a:solidFill>
+                <a:latin typeface="+mn-lt"/>
+                <a:sym typeface="Muli"/>
+              </a:rPr>
+              <a:t> install express –save</a:t>
+            </a:r>
+          </a:p>
+          <a:p>
+            <a:pPr marL="457200" indent="-457200">
+              <a:buFont typeface="+mj-lt"/>
+              <a:buAutoNum type="arabicPeriod" startAt="2"/>
+            </a:pPr>
+            <a:r>
+              <a:rPr lang="en-US" sz="1100" b="1" dirty="0">
+                <a:solidFill>
+                  <a:srgbClr val="FFFFFF"/>
+                </a:solidFill>
+                <a:latin typeface="+mn-lt"/>
+                <a:sym typeface="Muli"/>
+              </a:rPr>
+              <a:t>Yeoman</a:t>
+            </a:r>
+            <a:r>
+              <a:rPr lang="en-US" sz="1100" dirty="0">
+                <a:solidFill>
+                  <a:srgbClr val="FFFFFF"/>
+                </a:solidFill>
+                <a:latin typeface="+mn-lt"/>
+                <a:sym typeface="Muli"/>
+              </a:rPr>
+              <a:t> – then use this to create the folders necessary</a:t>
+            </a:r>
+          </a:p>
+          <a:p>
+            <a:pPr marL="628650" lvl="1" indent="-171450">
+              <a:buFont typeface="Arial" panose="020B0604020202020204" pitchFamily="34" charset="0"/>
+              <a:buChar char="•"/>
+            </a:pPr>
+            <a:r>
+              <a:rPr lang="en-US" sz="1100" dirty="0" err="1">
+                <a:solidFill>
+                  <a:srgbClr val="FFFFFF"/>
+                </a:solidFill>
+                <a:latin typeface="+mn-lt"/>
+                <a:sym typeface="Muli"/>
+              </a:rPr>
+              <a:t>Npm</a:t>
+            </a:r>
+            <a:r>
+              <a:rPr lang="en-US" sz="1100" dirty="0">
+                <a:solidFill>
+                  <a:srgbClr val="FFFFFF"/>
+                </a:solidFill>
+                <a:latin typeface="+mn-lt"/>
+                <a:sym typeface="Muli"/>
+              </a:rPr>
+              <a:t> install </a:t>
+            </a:r>
+            <a:r>
+              <a:rPr lang="en-US" sz="1100" dirty="0" err="1">
+                <a:solidFill>
+                  <a:srgbClr val="FFFFFF"/>
+                </a:solidFill>
+                <a:latin typeface="+mn-lt"/>
+                <a:sym typeface="Muli"/>
+              </a:rPr>
+              <a:t>yo</a:t>
+            </a:r>
+            <a:r>
+              <a:rPr lang="en-US" sz="1100" dirty="0">
+                <a:solidFill>
+                  <a:srgbClr val="FFFFFF"/>
+                </a:solidFill>
+                <a:latin typeface="+mn-lt"/>
+                <a:sym typeface="Muli"/>
+              </a:rPr>
+              <a:t> -g //install globally</a:t>
+            </a:r>
+          </a:p>
+          <a:p>
+            <a:pPr marL="628650" lvl="1" indent="-171450">
+              <a:buFont typeface="Arial" panose="020B0604020202020204" pitchFamily="34" charset="0"/>
+              <a:buChar char="•"/>
+            </a:pPr>
+            <a:r>
+              <a:rPr lang="en-US" sz="1100" dirty="0" err="1">
+                <a:solidFill>
+                  <a:srgbClr val="FFFFFF"/>
+                </a:solidFill>
+                <a:latin typeface="+mn-lt"/>
+                <a:sym typeface="Muli"/>
+              </a:rPr>
+              <a:t>Npm</a:t>
+            </a:r>
+            <a:r>
+              <a:rPr lang="en-US" sz="1100" dirty="0">
+                <a:solidFill>
+                  <a:srgbClr val="FFFFFF"/>
+                </a:solidFill>
+                <a:latin typeface="+mn-lt"/>
+                <a:sym typeface="Muli"/>
+              </a:rPr>
+              <a:t> install generator-</a:t>
+            </a:r>
+            <a:r>
+              <a:rPr lang="en-US" sz="1100" dirty="0" err="1">
+                <a:solidFill>
+                  <a:srgbClr val="FFFFFF"/>
+                </a:solidFill>
+                <a:latin typeface="+mn-lt"/>
+                <a:sym typeface="Muli"/>
+              </a:rPr>
+              <a:t>webapp</a:t>
+            </a:r>
+            <a:r>
+              <a:rPr lang="en-US" sz="1100" dirty="0">
+                <a:solidFill>
+                  <a:srgbClr val="FFFFFF"/>
+                </a:solidFill>
+                <a:latin typeface="+mn-lt"/>
+                <a:sym typeface="Muli"/>
+              </a:rPr>
+              <a:t> -g //install globally – supports bootstrap, </a:t>
+            </a:r>
+            <a:r>
+              <a:rPr lang="en-US" sz="1100" dirty="0" err="1">
+                <a:solidFill>
+                  <a:srgbClr val="FFFFFF"/>
+                </a:solidFill>
+                <a:latin typeface="+mn-lt"/>
+                <a:sym typeface="Muli"/>
+              </a:rPr>
+              <a:t>moderizer</a:t>
+            </a:r>
+            <a:endParaRPr lang="en-US" sz="1100" dirty="0">
+              <a:solidFill>
+                <a:srgbClr val="FFFFFF"/>
+              </a:solidFill>
+              <a:latin typeface="+mn-lt"/>
+              <a:sym typeface="Muli"/>
+            </a:endParaRPr>
+          </a:p>
+          <a:p>
+            <a:pPr marL="628650" lvl="1" indent="-171450">
+              <a:buFont typeface="Arial" panose="020B0604020202020204" pitchFamily="34" charset="0"/>
+              <a:buChar char="•"/>
+            </a:pPr>
+            <a:r>
+              <a:rPr lang="en-US" sz="1100" dirty="0" err="1">
+                <a:solidFill>
+                  <a:srgbClr val="FFFFFF"/>
+                </a:solidFill>
+                <a:latin typeface="+mn-lt"/>
+                <a:sym typeface="Muli"/>
+              </a:rPr>
+              <a:t>Yo</a:t>
+            </a:r>
+            <a:r>
+              <a:rPr lang="en-US" sz="1100" dirty="0">
+                <a:solidFill>
+                  <a:srgbClr val="FFFFFF"/>
+                </a:solidFill>
+                <a:latin typeface="+mn-lt"/>
+                <a:sym typeface="Muli"/>
+              </a:rPr>
+              <a:t> </a:t>
+            </a:r>
+            <a:r>
+              <a:rPr lang="en-US" sz="1100" dirty="0" err="1">
+                <a:solidFill>
+                  <a:srgbClr val="FFFFFF"/>
+                </a:solidFill>
+                <a:latin typeface="+mn-lt"/>
+                <a:sym typeface="Muli"/>
+              </a:rPr>
+              <a:t>webapp</a:t>
+            </a:r>
+            <a:r>
+              <a:rPr lang="en-US" sz="1100" dirty="0">
+                <a:solidFill>
+                  <a:srgbClr val="FFFFFF"/>
+                </a:solidFill>
+                <a:latin typeface="+mn-lt"/>
+                <a:sym typeface="Muli"/>
+              </a:rPr>
+              <a:t> //will ask you some questions</a:t>
+            </a:r>
+          </a:p>
+          <a:p>
+            <a:pPr marL="228600" indent="-228600">
+              <a:buFont typeface="+mj-lt"/>
+              <a:buAutoNum type="arabicPeriod" startAt="3"/>
+            </a:pPr>
+            <a:r>
+              <a:rPr lang="en-US" sz="1100" b="1" dirty="0">
+                <a:solidFill>
+                  <a:srgbClr val="FFFFFF"/>
+                </a:solidFill>
+                <a:latin typeface="+mn-lt"/>
+                <a:sym typeface="Muli"/>
+              </a:rPr>
+              <a:t>Start your application</a:t>
+            </a:r>
+          </a:p>
+          <a:p>
+            <a:pPr marL="628650" lvl="1" indent="-171450">
+              <a:buFont typeface="Arial" panose="020B0604020202020204" pitchFamily="34" charset="0"/>
+              <a:buChar char="•"/>
+            </a:pPr>
+            <a:r>
+              <a:rPr lang="en-US" sz="1100" dirty="0">
+                <a:solidFill>
+                  <a:srgbClr val="FFFFFF"/>
+                </a:solidFill>
+                <a:latin typeface="+mn-lt"/>
+                <a:sym typeface="Muli"/>
+              </a:rPr>
+              <a:t>Gulp serve // your done!!!!  </a:t>
+            </a:r>
+          </a:p>
           <a:p>
             <a:pPr>
               <a:spcBef>
@@ -8266,12 +8639,12 @@
               </a:spcBef>
               <a:buNone/>
             </a:pPr>
-            <a:r>
-              <a:rPr lang="en-US" sz="1800" dirty="0">
+            <a:fld id="{FF0E04E8-1E41-42FF-9015-9FDF9A6B04E8}" type="datetime4">
+              <a:rPr lang="en-US" sz="1800" smtClean="0">
                 <a:latin typeface="+mn-lt"/>
               </a:rPr>
-              <a:t>April 6, 2017</a:t>
-            </a:r>
+              <a:t>April 7, 2017</a:t>
+            </a:fld>
             <a:br>
               <a:rPr lang="en-US" sz="1800" dirty="0">
                 <a:latin typeface="+mn-lt"/>
@@ -8405,11 +8778,14 @@
               <a:buNone/>
             </a:pPr>
             <a:r>
-              <a:rPr lang="en" sz="4400" dirty="0">
+              <a:rPr lang="en-US" sz="4400" dirty="0">
                 <a:latin typeface="+mj-lt"/>
               </a:rPr>
-              <a:t>PROBLEM DEFINITION</a:t>
+              <a:t>OBJECTIVE/GOALS</a:t>
             </a:r>
+            <a:endParaRPr lang="en" sz="4400" dirty="0">
+              <a:latin typeface="+mj-lt"/>
+            </a:endParaRPr>
           </a:p>
         </p:txBody>
       </p:sp>
@@ -8425,8 +8801,8 @@
         </p:nvSpPr>
         <p:spPr>
           <a:xfrm>
-            <a:off x="3015609" y="2509102"/>
-            <a:ext cx="3341000" cy="2491662"/>
+            <a:off x="2692382" y="2475235"/>
+            <a:ext cx="3983502" cy="2491662"/>
           </a:xfrm>
           <a:prstGeom prst="rect">
             <a:avLst/>
@@ -8468,6 +8844,26 @@
             <a:r>
               <a:rPr lang="en-US" sz="2200" dirty="0"/>
               <a:t>The UI must be easy to understand and helpful</a:t>
+            </a:r>
+          </a:p>
+          <a:p>
+            <a:pPr marL="171450" indent="-171450">
+              <a:spcBef>
+                <a:spcPts val="600"/>
+              </a:spcBef>
+            </a:pPr>
+            <a:r>
+              <a:rPr lang="en-US" sz="2200" dirty="0">
+                <a:solidFill>
+                  <a:srgbClr val="FFFFFF"/>
+                </a:solidFill>
+                <a:sym typeface="Muli"/>
+              </a:rPr>
+              <a:t>Explain ide</a:t>
+            </a:r>
+            <a:r>
+              <a:rPr lang="en-US" sz="2200" dirty="0"/>
+              <a:t>as that can be used for any future implementations</a:t>
             </a:r>
             <a:endParaRPr lang="en" sz="2200" dirty="0">
               <a:solidFill>
@@ -9342,7 +9738,7 @@
         <p:spPr>
           <a:xfrm>
             <a:off x="2544682" y="758418"/>
-            <a:ext cx="6438897" cy="4205468"/>
+            <a:ext cx="5929733" cy="4205468"/>
           </a:xfrm>
         </p:spPr>
         <p:txBody>
@@ -9360,7 +9756,7 @@
               <a:buChar char="•"/>
             </a:pPr>
             <a:r>
-              <a:rPr lang="en-US" sz="1900" dirty="0">
+              <a:rPr lang="en-US" sz="1850" dirty="0">
                 <a:latin typeface="+mn-lt"/>
               </a:rPr>
               <a:t>JavaScript</a:t>
@@ -9378,7 +9774,7 @@
               <a:buChar char="•"/>
             </a:pPr>
             <a:r>
-              <a:rPr lang="en-US" sz="1900" dirty="0">
+              <a:rPr lang="en-US" sz="1850" dirty="0">
                 <a:latin typeface="+mn-lt"/>
               </a:rPr>
               <a:t>HTML5/CSS</a:t>
@@ -9396,10 +9792,10 @@
               <a:buChar char="•"/>
             </a:pPr>
             <a:r>
-              <a:rPr lang="en-US" sz="1900" dirty="0">
+              <a:rPr lang="en-US" sz="1850" dirty="0">
                 <a:latin typeface="+mn-lt"/>
               </a:rPr>
-              <a:t>Gulp</a:t>
+              <a:t>Node JS, Yeoman, Gulp</a:t>
             </a:r>
           </a:p>
           <a:p>
@@ -9414,7 +9810,49 @@
               <a:buChar char="•"/>
             </a:pPr>
             <a:r>
-              <a:rPr lang="en-US" sz="1900" dirty="0">
+              <a:rPr lang="en-US" sz="1850" dirty="0" err="1">
+                <a:latin typeface="+mn-lt"/>
+              </a:rPr>
+              <a:t>Cmder</a:t>
+            </a:r>
+            <a:endParaRPr lang="en-US" sz="1850" dirty="0">
+              <a:latin typeface="+mn-lt"/>
+            </a:endParaRPr>
+          </a:p>
+          <a:p>
+            <a:pPr marL="285750" indent="-285750" algn="just">
+              <a:spcBef>
+                <a:spcPts val="600"/>
+              </a:spcBef>
+              <a:spcAft>
+                <a:spcPts val="600"/>
+              </a:spcAft>
+              <a:buFont typeface="Arial" panose="020B0604020202020204" pitchFamily="34" charset="0"/>
+              <a:buChar char="•"/>
+            </a:pPr>
+            <a:r>
+              <a:rPr lang="en-US" sz="1850" dirty="0" err="1">
+                <a:latin typeface="+mn-lt"/>
+              </a:rPr>
+              <a:t>Github</a:t>
+            </a:r>
+            <a:endParaRPr lang="en-US" sz="1850" dirty="0">
+              <a:latin typeface="+mn-lt"/>
+            </a:endParaRPr>
+          </a:p>
+          <a:p>
+            <a:pPr marL="285750" indent="-285750" algn="just">
+              <a:spcBef>
+                <a:spcPts val="600"/>
+              </a:spcBef>
+              <a:spcAft>
+                <a:spcPts val="600"/>
+              </a:spcAft>
+              <a:buFont typeface="Arial" panose="020B0604020202020204" pitchFamily="34" charset="0"/>
+              <a:buChar char="•"/>
+            </a:pPr>
+            <a:r>
+              <a:rPr lang="en-US" sz="1850" dirty="0">
                 <a:latin typeface="+mn-lt"/>
               </a:rPr>
               <a:t>Libraries (Stylesheets/JavaScript)</a:t>
@@ -9432,7 +9870,7 @@
               <a:buChar char="•"/>
             </a:pPr>
             <a:r>
-              <a:rPr lang="en-US" sz="1900" dirty="0">
+              <a:rPr lang="en-US" sz="1850" dirty="0">
                 <a:latin typeface="+mn-lt"/>
               </a:rPr>
               <a:t>Bootstrap</a:t>
@@ -9450,14 +9888,11 @@
               <a:buChar char="•"/>
             </a:pPr>
             <a:r>
-              <a:rPr lang="en-US" sz="1900" dirty="0" err="1">
+              <a:rPr lang="en-US" sz="1850" dirty="0">
                 <a:latin typeface="+mn-lt"/>
               </a:rPr>
-              <a:t>FileSaver</a:t>
+              <a:t>Tim Creative – navbar</a:t>
             </a:r>
-            <a:endParaRPr lang="en-US" sz="1900" dirty="0">
-              <a:latin typeface="+mn-lt"/>
-            </a:endParaRPr>
           </a:p>
           <a:p>
             <a:pPr marL="577850" lvl="1" indent="-285750" algn="just">
@@ -9471,11 +9906,14 @@
               <a:buChar char="•"/>
             </a:pPr>
             <a:r>
-              <a:rPr lang="en-US" sz="1900" dirty="0">
+              <a:rPr lang="en-US" sz="1850" dirty="0" err="1">
                 <a:latin typeface="+mn-lt"/>
               </a:rPr>
-              <a:t>Tim Creative – navbar</a:t>
+              <a:t>FileSaver</a:t>
             </a:r>
+            <a:endParaRPr lang="en-US" sz="1850" dirty="0">
+              <a:latin typeface="+mn-lt"/>
+            </a:endParaRPr>
           </a:p>
           <a:p>
             <a:pPr marL="577850" lvl="1" indent="-285750" algn="just">
@@ -9489,12 +9927,12 @@
               <a:buChar char="•"/>
             </a:pPr>
             <a:r>
-              <a:rPr lang="en-US" sz="1900" dirty="0" err="1">
+              <a:rPr lang="en-US" sz="1850" dirty="0" err="1">
                 <a:latin typeface="+mn-lt"/>
               </a:rPr>
               <a:t>CodeMirror</a:t>
             </a:r>
-            <a:endParaRPr lang="en-US" sz="1900" dirty="0">
+            <a:endParaRPr lang="en-US" sz="1850" dirty="0">
               <a:latin typeface="+mn-lt"/>
             </a:endParaRPr>
           </a:p>
@@ -9573,11 +10011,14 @@
               <a:buNone/>
             </a:pPr>
             <a:r>
-              <a:rPr lang="en" sz="2800" dirty="0">
+              <a:rPr lang="en-US" sz="2800" dirty="0">
                 <a:latin typeface="+mj-lt"/>
               </a:rPr>
-              <a:t>ALGORITHM IMPLEMENTED</a:t>
+              <a:t>OVERVIEW OF UI COMPONENTS</a:t>
             </a:r>
+            <a:endParaRPr lang="en" sz="2800" dirty="0">
+              <a:latin typeface="+mj-lt"/>
+            </a:endParaRPr>
           </a:p>
         </p:txBody>
       </p:sp>
@@ -9625,7 +10066,7 @@
                 <a:ea typeface="Muli"/>
                 <a:cs typeface="Muli"/>
               </a:rPr>
-              <a:t>The Boolean Satisfiability problem is extensively being researched in computer science</a:t>
+              <a:t>Responsive</a:t>
             </a:r>
           </a:p>
           <a:p>
@@ -9648,11 +10089,11 @@
                 <a:ea typeface="Muli"/>
                 <a:cs typeface="Muli"/>
               </a:rPr>
-              <a:t>DPLL (Davis, Putname, Logemann, Loveland) – Backtracking algorithm</a:t>
+              <a:t>Navbar that contains immediate features</a:t>
             </a:r>
           </a:p>
           <a:p>
-            <a:pPr marL="285750" lvl="1" indent="-285750">
+            <a:pPr marL="522288" lvl="1" indent="-285750">
               <a:spcBef>
                 <a:spcPts val="300"/>
               </a:spcBef>
@@ -9671,7 +10112,75 @@
                 <a:ea typeface="Muli"/>
                 <a:cs typeface="Muli"/>
               </a:rPr>
-              <a:t>The DPLL was implemented in various SAT Solver, such as the Chaff, zChaff, GRASP, and Minisat</a:t>
+              <a:t>Undo, Redo, File Upload, New File, Save File, Run Program, Tutorial</a:t>
+            </a:r>
+          </a:p>
+          <a:p>
+            <a:pPr marL="285750" lvl="1" indent="-285750">
+              <a:spcBef>
+                <a:spcPts val="300"/>
+              </a:spcBef>
+              <a:spcAft>
+                <a:spcPts val="300"/>
+              </a:spcAft>
+              <a:buFont typeface="Arial" panose="020B0604020202020204" pitchFamily="34" charset="0"/>
+              <a:buChar char="•"/>
+            </a:pPr>
+            <a:r>
+              <a:rPr lang="en-US" sz="1800" dirty="0">
+                <a:solidFill>
+                  <a:srgbClr val="595959"/>
+                </a:solidFill>
+                <a:latin typeface="+mn-lt"/>
+                <a:ea typeface="Muli"/>
+                <a:cs typeface="Muli"/>
+              </a:rPr>
+              <a:t>Results section</a:t>
+            </a:r>
+          </a:p>
+          <a:p>
+            <a:pPr marL="571500" lvl="2" indent="-285750">
+              <a:spcBef>
+                <a:spcPts val="300"/>
+              </a:spcBef>
+              <a:spcAft>
+                <a:spcPts val="300"/>
+              </a:spcAft>
+              <a:buFont typeface="Arial" panose="020B0604020202020204" pitchFamily="34" charset="0"/>
+              <a:buChar char="•"/>
+            </a:pPr>
+            <a:r>
+              <a:rPr lang="en-US" sz="1800" dirty="0">
+                <a:solidFill>
+                  <a:srgbClr val="595959"/>
+                </a:solidFill>
+                <a:latin typeface="+mn-lt"/>
+                <a:ea typeface="Muli"/>
+                <a:cs typeface="Muli"/>
+              </a:rPr>
+              <a:t>Lexical Table, Tokens, </a:t>
+            </a:r>
+            <a:r>
+              <a:rPr lang="en-US" sz="1800" dirty="0" err="1">
+                <a:solidFill>
+                  <a:srgbClr val="595959"/>
+                </a:solidFill>
+                <a:latin typeface="+mn-lt"/>
+                <a:ea typeface="Muli"/>
+                <a:cs typeface="Muli"/>
+              </a:rPr>
+              <a:t>Mcode</a:t>
+            </a:r>
+            <a:r>
+              <a:rPr lang="en-US" sz="1800" dirty="0">
+                <a:solidFill>
+                  <a:srgbClr val="595959"/>
+                </a:solidFill>
+                <a:latin typeface="+mn-lt"/>
+                <a:ea typeface="Muli"/>
+                <a:cs typeface="Muli"/>
+              </a:rPr>
+              <a:t>, Stacks and Registers</a:t>
             </a:r>
           </a:p>
         </p:txBody>
@@ -9685,7 +10194,7 @@
         <p:spPr>
           <a:xfrm>
             <a:off x="4718454" y="902269"/>
-            <a:ext cx="3266220" cy="3170099"/>
+            <a:ext cx="3266220" cy="1754326"/>
           </a:xfrm>
           <a:prstGeom prst="rect">
             <a:avLst/>
@@ -9711,7 +10220,7 @@
                 <a:ea typeface="Muli"/>
                 <a:cs typeface="Muli"/>
               </a:rPr>
-              <a:t>Java Implementation</a:t>
+              <a:t>Console</a:t>
             </a:r>
           </a:p>
           <a:p>
@@ -9720,7 +10229,7 @@
               <a:buChar char="•"/>
             </a:pPr>
             <a:r>
-              <a:rPr lang="en-US" sz="1800" b="1" dirty="0">
+              <a:rPr lang="en-US" sz="1800" dirty="0">
                 <a:solidFill>
                   <a:srgbClr val="595959"/>
                 </a:solidFill>
@@ -9728,28 +10237,13 @@
                 <a:ea typeface="Muli"/>
                 <a:cs typeface="Muli"/>
               </a:rPr>
-              <a:t>Unit Clause</a:t>
-            </a:r>
-            <a:r>
-              <a:rPr lang="en-US" sz="1800" dirty="0">
-                <a:solidFill>
-                  <a:srgbClr val="595959"/>
-                </a:solidFill>
-                <a:latin typeface="+mn-lt"/>
-                <a:ea typeface="Muli"/>
-                <a:cs typeface="Muli"/>
-              </a:rPr>
-              <a:t>: It is a clause that has one unassigned literal. </a:t>
+              <a:t>Editing/Inserting/Pasting Code Section</a:t>
             </a:r>
           </a:p>
           <a:p>
-            <a:pPr lvl="1" algn="ctr">
-              <a:spcBef>
-                <a:spcPts val="600"/>
-              </a:spcBef>
-              <a:spcAft>
-                <a:spcPts val="1200"/>
-              </a:spcAft>
+            <a:pPr marL="636588" lvl="1" indent="-285750">
+              <a:buFont typeface="Arial" panose="020B0604020202020204" pitchFamily="34" charset="0"/>
+              <a:buChar char="•"/>
             </a:pPr>
             <a:r>
               <a:rPr lang="en-US" sz="1800" dirty="0">
@@ -9760,7 +10254,7 @@
                 <a:ea typeface="Muli"/>
                 <a:cs typeface="Muli"/>
               </a:rPr>
-              <a:t>(¬x1 ∨ x2) ^ (¬ x2) </a:t>
+              <a:t>Colored reserved words and numbers</a:t>
             </a:r>
           </a:p>
           <a:p>
@@ -9769,7 +10263,7 @@
               <a:buChar char="•"/>
             </a:pPr>
             <a:r>
-              <a:rPr lang="en-US" sz="1800" b="1" dirty="0">
+              <a:rPr lang="en-US" sz="1800" dirty="0">
                 <a:solidFill>
                   <a:srgbClr val="595959"/>
                 </a:solidFill>
@@ -9777,43 +10271,216 @@
                 <a:ea typeface="Muli"/>
                 <a:cs typeface="Muli"/>
               </a:rPr>
-              <a:t>Pure Literal</a:t>
-            </a:r>
-            <a:r>
-              <a:rPr lang="en-US" sz="1800" dirty="0">
-                <a:solidFill>
-                  <a:srgbClr val="595959"/>
-                </a:solidFill>
-                <a:latin typeface="+mn-lt"/>
-                <a:ea typeface="Muli"/>
-                <a:cs typeface="Muli"/>
-              </a:rPr>
-              <a:t>: If there is a literal in the formula with only one polarity, it is considered pure.</a:t>
-            </a:r>
-          </a:p>
-          <a:p>
-            <a:pPr lvl="1" algn="ctr">
-              <a:spcBef>
-                <a:spcPts val="600"/>
-              </a:spcBef>
-              <a:spcAft>
-                <a:spcPts val="600"/>
-              </a:spcAft>
-            </a:pPr>
-            <a:r>
-              <a:rPr lang="en-US" sz="1800" dirty="0">
-                <a:solidFill>
-                  <a:srgbClr val="595959"/>
-                </a:solidFill>
-                <a:latin typeface="+mn-lt"/>
-                <a:ea typeface="Muli"/>
-                <a:cs typeface="Muli"/>
-              </a:rPr>
-              <a:t>(x1 ∨ ¬x2) ^ (¬x1 ∨ x2 ∨ x3) </a:t>
+              <a:t>Stack Review Section </a:t>
             </a:r>
           </a:p>
         </p:txBody>
       </p:sp>
+      <p:graphicFrame>
+        <p:nvGraphicFramePr>
+          <p:cNvPr id="2" name="Table 1"/>
+          <p:cNvGraphicFramePr>
+            <a:graphicFrameLocks noGrp="1"/>
+          </p:cNvGraphicFramePr>
+          <p:nvPr>
+            <p:extLst>
+              <p:ext uri="{D42A27DB-BD31-4B8C-83A1-F6EECF244321}">
+                <p14:modId xmlns:p14="http://schemas.microsoft.com/office/powerpoint/2010/main" val="2911590942"/>
+              </p:ext>
+            </p:extLst>
+          </p:nvPr>
+        </p:nvGraphicFramePr>
+        <p:xfrm>
+          <a:off x="5183820" y="2656595"/>
+          <a:ext cx="2049738" cy="2187120"/>
+        </p:xfrm>
+        <a:graphic>
+          <a:graphicData uri="http://schemas.openxmlformats.org/drawingml/2006/table">
+            <a:tbl>
+              <a:tblPr firstRow="1" bandRow="1">
+                <a:tableStyleId>{5E90052B-7BD1-45E2-9E98-33B2B037D73E}</a:tableStyleId>
+              </a:tblPr>
+              <a:tblGrid>
+                <a:gridCol w="2049738">
+                  <a:extLst>
+                    <a:ext uri="{9D8B030D-6E8A-4147-A177-3AD203B41FA5}">
+                      <a16:colId xmlns:a16="http://schemas.microsoft.com/office/drawing/2014/main" val="384636365"/>
+                    </a:ext>
+                  </a:extLst>
+                </a:gridCol>
+              </a:tblGrid>
+              <a:tr h="364520">
+                <a:tc>
+                  <a:txBody>
+                    <a:bodyPr/>
+                    <a:lstStyle/>
+                    <a:p>
+                      <a:pPr algn="ctr"/>
+                      <a:r>
+                        <a:rPr lang="en-US" dirty="0"/>
+                        <a:t>Functional Value</a:t>
+                      </a:r>
+                    </a:p>
+                  </a:txBody>
+                  <a:tcPr>
+                    <a:solidFill>
+                      <a:schemeClr val="bg1">
+                        <a:lumMod val="95000"/>
+                        <a:alpha val="59000"/>
+                      </a:schemeClr>
+                    </a:solidFill>
+                  </a:tcPr>
+                </a:tc>
+                <a:extLst>
+                  <a:ext uri="{0D108BD9-81ED-4DB2-BD59-A6C34878D82A}">
+                    <a16:rowId xmlns:a16="http://schemas.microsoft.com/office/drawing/2014/main" val="1410816890"/>
+                  </a:ext>
+                </a:extLst>
+              </a:tr>
+              <a:tr h="364520">
+                <a:tc>
+                  <a:txBody>
+                    <a:bodyPr/>
+                    <a:lstStyle/>
+                    <a:p>
+                      <a:pPr algn="ctr"/>
+                      <a:r>
+                        <a:rPr lang="en-US" dirty="0"/>
+                        <a:t>Parameters</a:t>
+                      </a:r>
+                    </a:p>
+                  </a:txBody>
+                  <a:tcPr>
+                    <a:solidFill>
+                      <a:schemeClr val="bg1">
+                        <a:lumMod val="95000"/>
+                        <a:alpha val="59000"/>
+                      </a:schemeClr>
+                    </a:solidFill>
+                  </a:tcPr>
+                </a:tc>
+                <a:extLst>
+                  <a:ext uri="{0D108BD9-81ED-4DB2-BD59-A6C34878D82A}">
+                    <a16:rowId xmlns:a16="http://schemas.microsoft.com/office/drawing/2014/main" val="91207726"/>
+                  </a:ext>
+                </a:extLst>
+              </a:tr>
+              <a:tr h="364520">
+                <a:tc>
+                  <a:txBody>
+                    <a:bodyPr/>
+                    <a:lstStyle/>
+                    <a:p>
+                      <a:pPr algn="ctr"/>
+                      <a:r>
+                        <a:rPr lang="en-US" dirty="0"/>
+                        <a:t>Locals</a:t>
+                      </a:r>
+                    </a:p>
+                  </a:txBody>
+                  <a:tcPr>
+                    <a:solidFill>
+                      <a:schemeClr val="bg1">
+                        <a:lumMod val="95000"/>
+                        <a:alpha val="59000"/>
+                      </a:schemeClr>
+                    </a:solidFill>
+                  </a:tcPr>
+                </a:tc>
+                <a:extLst>
+                  <a:ext uri="{0D108BD9-81ED-4DB2-BD59-A6C34878D82A}">
+                    <a16:rowId xmlns:a16="http://schemas.microsoft.com/office/drawing/2014/main" val="1770631764"/>
+                  </a:ext>
+                </a:extLst>
+              </a:tr>
+              <a:tr h="364520">
+                <a:tc>
+                  <a:txBody>
+                    <a:bodyPr/>
+                    <a:lstStyle/>
+                    <a:p>
+                      <a:pPr algn="ctr"/>
+                      <a:r>
+                        <a:rPr lang="en-US" dirty="0"/>
+                        <a:t>Return Address</a:t>
+                      </a:r>
+                    </a:p>
+                  </a:txBody>
+                  <a:tcPr>
+                    <a:solidFill>
+                      <a:schemeClr val="bg1">
+                        <a:lumMod val="95000"/>
+                        <a:alpha val="59000"/>
+                      </a:schemeClr>
+                    </a:solidFill>
+                  </a:tcPr>
+                </a:tc>
+                <a:extLst>
+                  <a:ext uri="{0D108BD9-81ED-4DB2-BD59-A6C34878D82A}">
+                    <a16:rowId xmlns:a16="http://schemas.microsoft.com/office/drawing/2014/main" val="3866153934"/>
+                  </a:ext>
+                </a:extLst>
+              </a:tr>
+              <a:tr h="364520">
+                <a:tc>
+                  <a:txBody>
+                    <a:bodyPr/>
+                    <a:lstStyle/>
+                    <a:p>
+                      <a:pPr algn="ctr"/>
+                      <a:r>
+                        <a:rPr lang="en-US" dirty="0"/>
+                        <a:t>Dynamic Link</a:t>
+                      </a:r>
+                    </a:p>
+                  </a:txBody>
+                  <a:tcPr>
+                    <a:solidFill>
+                      <a:schemeClr val="bg1">
+                        <a:lumMod val="95000"/>
+                        <a:alpha val="59000"/>
+                      </a:schemeClr>
+                    </a:solidFill>
+                  </a:tcPr>
+                </a:tc>
+                <a:extLst>
+                  <a:ext uri="{0D108BD9-81ED-4DB2-BD59-A6C34878D82A}">
+                    <a16:rowId xmlns:a16="http://schemas.microsoft.com/office/drawing/2014/main" val="2419502815"/>
+                  </a:ext>
+                </a:extLst>
+              </a:tr>
+              <a:tr h="364520">
+                <a:tc>
+                  <a:txBody>
+                    <a:bodyPr/>
+                    <a:lstStyle/>
+                    <a:p>
+                      <a:pPr algn="ctr"/>
+                      <a:r>
+                        <a:rPr lang="en-US" dirty="0"/>
+                        <a:t>Static Link</a:t>
+                      </a:r>
+                    </a:p>
+                  </a:txBody>
+                  <a:tcPr>
+                    <a:solidFill>
+                      <a:schemeClr val="bg1">
+                        <a:lumMod val="95000"/>
+                        <a:alpha val="59000"/>
+                      </a:schemeClr>
+                    </a:solidFill>
+                  </a:tcPr>
+                </a:tc>
+                <a:extLst>
+                  <a:ext uri="{0D108BD9-81ED-4DB2-BD59-A6C34878D82A}">
+                    <a16:rowId xmlns:a16="http://schemas.microsoft.com/office/drawing/2014/main" val="1623240812"/>
+                  </a:ext>
+                </a:extLst>
+              </a:tr>
+            </a:tbl>
+          </a:graphicData>
+        </a:graphic>
+      </p:graphicFrame>
     </p:spTree>
   </p:cSld>
   <p:clrMapOvr>
@@ -10623,7 +11290,7 @@
                 </a:solidFill>
                 <a:latin typeface="+mn-lt"/>
               </a:rPr>
-              <a:t>Revise and Add more components to Tutorial page</a:t>
+              <a:t>Revise and add more components to Tutorial page</a:t>
             </a:r>
           </a:p>
           <a:p>
@@ -11836,7 +12503,7 @@
                 <a:ea typeface="Muli"/>
                 <a:cs typeface="Muli"/>
               </a:rPr>
-              <a:t>Learn how JavaScript can complicate the implementation of the UI</a:t>
+              <a:t>Learned how JavaScript can complicate the implementation of the UI</a:t>
             </a:r>
           </a:p>
           <a:p>
@@ -11859,7 +12526,7 @@
                 <a:ea typeface="Muli"/>
                 <a:cs typeface="Muli"/>
               </a:rPr>
-              <a:t>Give </a:t>
+              <a:t>Give suggestions for future web development projects</a:t>
             </a:r>
           </a:p>
         </p:txBody>
@@ -12410,12 +13077,20 @@
           <a:p>
             <a:pPr algn="ctr"/>
             <a:r>
+              <a:rPr lang="en-US" sz="8800" dirty="0">
+                <a:solidFill>
+                  <a:schemeClr val="bg1"/>
+                </a:solidFill>
+              </a:rPr>
+              <a:t>Thank you</a:t>
+            </a:r>
+            <a:r>
               <a:rPr lang="en" sz="8800" dirty="0">
                 <a:solidFill>
                   <a:schemeClr val="bg1"/>
                 </a:solidFill>
               </a:rPr>
-              <a:t>Thanks!</a:t>
+              <a:t>!</a:t>
             </a:r>
           </a:p>
         </p:txBody>

</xml_diff>